<commit_message>
Improvements in Introduction-to-ASP.NET.pptx presentation
</commit_message>
<xml_diff>
--- a/02. ASP.NET-Web-Forms-Intro/ASP.NET-Web-Forms-Intro.pptx
+++ b/02. ASP.NET-Web-Forms-Intro/ASP.NET-Web-Forms-Intro.pptx
@@ -5,10 +5,10 @@
     <p:sldMasterId id="2147483672" r:id="rId1"/>
   </p:sldMasterIdLst>
   <p:notesMasterIdLst>
-    <p:notesMasterId r:id="rId39"/>
+    <p:notesMasterId r:id="rId38"/>
   </p:notesMasterIdLst>
   <p:handoutMasterIdLst>
-    <p:handoutMasterId r:id="rId40"/>
+    <p:handoutMasterId r:id="rId39"/>
   </p:handoutMasterIdLst>
   <p:sldIdLst>
     <p:sldId id="320" r:id="rId2"/>
@@ -46,8 +46,7 @@
     <p:sldId id="368" r:id="rId34"/>
     <p:sldId id="369" r:id="rId35"/>
     <p:sldId id="334" r:id="rId36"/>
-    <p:sldId id="374" r:id="rId37"/>
-    <p:sldId id="333" r:id="rId38"/>
+    <p:sldId id="333" r:id="rId37"/>
   </p:sldIdLst>
   <p:sldSz cx="9144000" cy="6858000" type="screen4x3"/>
   <p:notesSz cx="6881813" cy="9296400"/>
@@ -324,7 +323,7 @@
             <a:fld id="{3BF7C7B5-275F-4D1F-9AB4-9255447DBC73}" type="datetimeFigureOut">
               <a:rPr lang="en-US"/>
               <a:pPr/>
-              <a:t>10/21/2014</a:t>
+              <a:t>1/17/2016</a:t>
             </a:fld>
             <a:endParaRPr lang="en-US" dirty="0"/>
           </a:p>
@@ -555,7 +554,7 @@
             <a:fld id="{9B46F231-FB2B-4655-A644-E2477325E686}" type="datetimeFigureOut">
               <a:rPr lang="en-US"/>
               <a:pPr/>
-              <a:t>10/21/2014</a:t>
+              <a:t>1/17/2016</a:t>
             </a:fld>
             <a:endParaRPr lang="en-US" dirty="0"/>
           </a:p>
@@ -4225,146 +4224,6 @@
     <p:extLst>
       <p:ext uri="{BB962C8B-B14F-4D97-AF65-F5344CB8AC3E}">
         <p14:creationId xmlns:p14="http://schemas.microsoft.com/office/powerpoint/2010/main" val="1973112393"/>
-      </p:ext>
-    </p:extLst>
-  </p:cSld>
-  <p:clrMapOvr>
-    <a:masterClrMapping/>
-  </p:clrMapOvr>
-</p:notes>
-</file>
-
-<file path=ppt/notesSlides/notesSlide24.xml><?xml version="1.0" encoding="utf-8"?>
-<p:notes xmlns:a="http://schemas.openxmlformats.org/drawingml/2006/main" xmlns:r="http://schemas.openxmlformats.org/officeDocument/2006/relationships" xmlns:p="http://schemas.openxmlformats.org/presentationml/2006/main">
-  <p:cSld>
-    <p:spTree>
-      <p:nvGrpSpPr>
-        <p:cNvPr id="1" name=""/>
-        <p:cNvGrpSpPr/>
-        <p:nvPr/>
-      </p:nvGrpSpPr>
-      <p:grpSpPr>
-        <a:xfrm>
-          <a:off x="0" y="0"/>
-          <a:ext cx="0" cy="0"/>
-          <a:chOff x="0" y="0"/>
-          <a:chExt cx="0" cy="0"/>
-        </a:xfrm>
-      </p:grpSpPr>
-      <p:sp>
-        <p:nvSpPr>
-          <p:cNvPr id="4" name="Rectangle 2"/>
-          <p:cNvSpPr>
-            <a:spLocks noGrp="1" noChangeArrowheads="1"/>
-          </p:cNvSpPr>
-          <p:nvPr>
-            <p:ph type="hdr" sz="quarter"/>
-          </p:nvPr>
-        </p:nvSpPr>
-        <p:spPr>
-          <a:ln/>
-        </p:spPr>
-        <p:txBody>
-          <a:bodyPr/>
-          <a:lstStyle/>
-          <a:p>
-            <a:r>
-              <a:rPr lang="en-US" dirty="0"/>
-              <a:t>*</a:t>
-            </a:r>
-          </a:p>
-        </p:txBody>
-      </p:sp>
-      <p:sp>
-        <p:nvSpPr>
-          <p:cNvPr id="5" name="Rectangle 6"/>
-          <p:cNvSpPr>
-            <a:spLocks noGrp="1" noChangeArrowheads="1"/>
-          </p:cNvSpPr>
-          <p:nvPr>
-            <p:ph type="ftr" sz="quarter" idx="4"/>
-          </p:nvPr>
-        </p:nvSpPr>
-        <p:spPr>
-          <a:ln/>
-        </p:spPr>
-        <p:txBody>
-          <a:bodyPr/>
-          <a:lstStyle/>
-          <a:p>
-            <a:r>
-              <a:rPr lang="en-US" dirty="0"/>
-              <a:t>(c) 2008 National Academy for Software Development - http://academy.devbg.org. All rights reserved. Unauthorized copying or re-distribution is strictly prohibited.*</a:t>
-            </a:r>
-          </a:p>
-        </p:txBody>
-      </p:sp>
-      <p:sp>
-        <p:nvSpPr>
-          <p:cNvPr id="6" name="Rectangle 7"/>
-          <p:cNvSpPr>
-            <a:spLocks noGrp="1" noChangeArrowheads="1"/>
-          </p:cNvSpPr>
-          <p:nvPr>
-            <p:ph type="sldNum" sz="quarter" idx="5"/>
-          </p:nvPr>
-        </p:nvSpPr>
-        <p:spPr>
-          <a:ln/>
-        </p:spPr>
-        <p:txBody>
-          <a:bodyPr/>
-          <a:lstStyle/>
-          <a:p>
-            <a:fld id="{7E89B841-8A48-48DC-813C-151166E312BA}" type="slidenum">
-              <a:rPr lang="en-US"/>
-              <a:pPr/>
-              <a:t>36</a:t>
-            </a:fld>
-            <a:r>
-              <a:rPr lang="en-US" dirty="0"/>
-              <a:t>##</a:t>
-            </a:r>
-          </a:p>
-        </p:txBody>
-      </p:sp>
-      <p:sp>
-        <p:nvSpPr>
-          <p:cNvPr id="545794" name="Rectangle 2"/>
-          <p:cNvSpPr>
-            <a:spLocks noGrp="1" noRot="1" noChangeAspect="1" noChangeArrowheads="1" noTextEdit="1"/>
-          </p:cNvSpPr>
-          <p:nvPr>
-            <p:ph type="sldImg"/>
-          </p:nvPr>
-        </p:nvSpPr>
-        <p:spPr>
-          <a:ln/>
-        </p:spPr>
-      </p:sp>
-      <p:sp>
-        <p:nvSpPr>
-          <p:cNvPr id="545795" name="Rectangle 3"/>
-          <p:cNvSpPr>
-            <a:spLocks noGrp="1" noChangeArrowheads="1"/>
-          </p:cNvSpPr>
-          <p:nvPr>
-            <p:ph type="body" idx="1"/>
-          </p:nvPr>
-        </p:nvSpPr>
-        <p:spPr/>
-        <p:txBody>
-          <a:bodyPr/>
-          <a:lstStyle/>
-          <a:p>
-            <a:endParaRPr lang="bg-BG"/>
-          </a:p>
-        </p:txBody>
-      </p:sp>
-    </p:spTree>
-    <p:extLst>
-      <p:ext uri="{BB962C8B-B14F-4D97-AF65-F5344CB8AC3E}">
-        <p14:creationId xmlns:p14="http://schemas.microsoft.com/office/powerpoint/2010/main" val="3582086883"/>
       </p:ext>
     </p:extLst>
   </p:cSld>
@@ -20855,324 +20714,6 @@
 </file>
 
 <file path=ppt/slides/slide36.xml><?xml version="1.0" encoding="utf-8"?>
-<p:sld xmlns:a="http://schemas.openxmlformats.org/drawingml/2006/main" xmlns:r="http://schemas.openxmlformats.org/officeDocument/2006/relationships" xmlns:p="http://schemas.openxmlformats.org/presentationml/2006/main">
-  <p:cSld>
-    <p:spTree>
-      <p:nvGrpSpPr>
-        <p:cNvPr id="1" name=""/>
-        <p:cNvGrpSpPr/>
-        <p:nvPr/>
-      </p:nvGrpSpPr>
-      <p:grpSpPr>
-        <a:xfrm>
-          <a:off x="0" y="0"/>
-          <a:ext cx="0" cy="0"/>
-          <a:chOff x="0" y="0"/>
-          <a:chExt cx="0" cy="0"/>
-        </a:xfrm>
-      </p:grpSpPr>
-      <p:sp>
-        <p:nvSpPr>
-          <p:cNvPr id="544770" name="Rectangle 2"/>
-          <p:cNvSpPr>
-            <a:spLocks noGrp="1" noChangeArrowheads="1"/>
-          </p:cNvSpPr>
-          <p:nvPr>
-            <p:ph type="title"/>
-          </p:nvPr>
-        </p:nvSpPr>
-        <p:spPr/>
-        <p:txBody>
-          <a:bodyPr/>
-          <a:lstStyle/>
-          <a:p>
-            <a:r>
-              <a:rPr lang="en-US" dirty="0" smtClean="0"/>
-              <a:t>Homework</a:t>
-            </a:r>
-            <a:endParaRPr lang="bg-BG" dirty="0"/>
-          </a:p>
-        </p:txBody>
-      </p:sp>
-      <p:sp>
-        <p:nvSpPr>
-          <p:cNvPr id="544771" name="Rectangle 3"/>
-          <p:cNvSpPr>
-            <a:spLocks noGrp="1" noChangeArrowheads="1"/>
-          </p:cNvSpPr>
-          <p:nvPr>
-            <p:ph idx="1"/>
-          </p:nvPr>
-        </p:nvSpPr>
-        <p:spPr>
-          <a:xfrm>
-            <a:off x="228600" y="990600"/>
-            <a:ext cx="8686800" cy="5638800"/>
-          </a:xfrm>
-        </p:spPr>
-        <p:txBody>
-          <a:bodyPr/>
-          <a:lstStyle/>
-          <a:p>
-            <a:pPr marL="446088" indent="-446088">
-              <a:lnSpc>
-                <a:spcPts val="3700"/>
-              </a:lnSpc>
-              <a:buFontTx/>
-              <a:buAutoNum type="arabicPeriod"/>
-              <a:tabLst/>
-            </a:pPr>
-            <a:r>
-              <a:rPr lang="en-US" sz="2800" dirty="0" smtClean="0"/>
-              <a:t>Create a simple ASPX page that enters a name and prints </a:t>
-            </a:r>
-            <a:r>
-              <a:rPr lang="en-US" sz="2800" dirty="0" smtClean="0">
-                <a:solidFill>
-                  <a:schemeClr val="accent5">
-                    <a:lumMod val="20000"/>
-                    <a:lumOff val="80000"/>
-                  </a:schemeClr>
-                </a:solidFill>
-              </a:rPr>
-              <a:t>"Hello" + name</a:t>
-            </a:r>
-            <a:r>
-              <a:rPr lang="en-US" sz="2800" dirty="0" smtClean="0"/>
-              <a:t> in the page. Use a </a:t>
-            </a:r>
-            <a:r>
-              <a:rPr lang="en-US" sz="2800" noProof="1" smtClean="0">
-                <a:solidFill>
-                  <a:schemeClr val="accent5">
-                    <a:lumMod val="20000"/>
-                    <a:lumOff val="80000"/>
-                  </a:schemeClr>
-                </a:solidFill>
-                <a:latin typeface="Consolas" panose="020B0609020204030204" pitchFamily="49" charset="0"/>
-                <a:cs typeface="Consolas" panose="020B0609020204030204" pitchFamily="49" charset="0"/>
-              </a:rPr>
-              <a:t>TextBox</a:t>
-            </a:r>
-            <a:r>
-              <a:rPr lang="en-US" sz="2800" dirty="0" smtClean="0"/>
-              <a:t> + </a:t>
-            </a:r>
-            <a:r>
-              <a:rPr lang="en-US" sz="2800" dirty="0" smtClean="0">
-                <a:solidFill>
-                  <a:schemeClr val="accent5">
-                    <a:lumMod val="20000"/>
-                    <a:lumOff val="80000"/>
-                  </a:schemeClr>
-                </a:solidFill>
-                <a:latin typeface="Consolas" panose="020B0609020204030204" pitchFamily="49" charset="0"/>
-                <a:cs typeface="Consolas" panose="020B0609020204030204" pitchFamily="49" charset="0"/>
-              </a:rPr>
-              <a:t>Button</a:t>
-            </a:r>
-            <a:r>
-              <a:rPr lang="en-US" sz="2800" dirty="0" smtClean="0"/>
-              <a:t> + </a:t>
-            </a:r>
-            <a:r>
-              <a:rPr lang="en-US" sz="2800" dirty="0" smtClean="0">
-                <a:solidFill>
-                  <a:schemeClr val="accent5">
-                    <a:lumMod val="20000"/>
-                    <a:lumOff val="80000"/>
-                  </a:schemeClr>
-                </a:solidFill>
-                <a:latin typeface="Consolas" panose="020B0609020204030204" pitchFamily="49" charset="0"/>
-                <a:cs typeface="Consolas" panose="020B0609020204030204" pitchFamily="49" charset="0"/>
-              </a:rPr>
-              <a:t>Label</a:t>
-            </a:r>
-            <a:r>
-              <a:rPr lang="en-US" sz="2800" dirty="0" smtClean="0"/>
-              <a:t>.</a:t>
-            </a:r>
-          </a:p>
-          <a:p>
-            <a:pPr marL="446088" indent="-446088">
-              <a:lnSpc>
-                <a:spcPts val="3700"/>
-              </a:lnSpc>
-              <a:buFontTx/>
-              <a:buAutoNum type="arabicPeriod"/>
-              <a:tabLst/>
-            </a:pPr>
-            <a:r>
-              <a:rPr lang="en-US" sz="2800" dirty="0" smtClean="0"/>
-              <a:t>Start </a:t>
-            </a:r>
-            <a:r>
-              <a:rPr lang="en-US" sz="2800" dirty="0"/>
-              <a:t>Visual Studio </a:t>
-            </a:r>
-            <a:r>
-              <a:rPr lang="en-US" sz="2800" dirty="0" smtClean="0"/>
-              <a:t>and create new </a:t>
-            </a:r>
-            <a:r>
-              <a:rPr lang="en-US" sz="2800" dirty="0"/>
-              <a:t>Web </a:t>
-            </a:r>
-            <a:r>
-              <a:rPr lang="en-US" sz="2800" dirty="0" smtClean="0"/>
-              <a:t>Forms App. </a:t>
-            </a:r>
-            <a:r>
-              <a:rPr lang="en-US" sz="2800" dirty="0"/>
-              <a:t>Look at the files generated and tell what's purpose of each file. Explain </a:t>
-            </a:r>
-            <a:r>
-              <a:rPr lang="en-US" sz="2800" dirty="0" smtClean="0"/>
-              <a:t>the "code behind</a:t>
-            </a:r>
-            <a:r>
-              <a:rPr lang="en-US" sz="2800" dirty="0"/>
-              <a:t>" model. Print "</a:t>
-            </a:r>
-            <a:r>
-              <a:rPr lang="en-US" sz="2800" dirty="0" smtClean="0"/>
-              <a:t>Hello, </a:t>
-            </a:r>
-            <a:r>
-              <a:rPr lang="en-US" sz="2800" dirty="0"/>
-              <a:t>ASP.NET" from </a:t>
-            </a:r>
-            <a:r>
-              <a:rPr lang="en-US" sz="2800" dirty="0" smtClean="0"/>
-              <a:t>the C# code and from the </a:t>
-            </a:r>
-            <a:r>
-              <a:rPr lang="en-US" sz="2800" noProof="1" smtClean="0">
-                <a:solidFill>
-                  <a:schemeClr val="accent5">
-                    <a:lumMod val="20000"/>
-                    <a:lumOff val="80000"/>
-                  </a:schemeClr>
-                </a:solidFill>
-                <a:latin typeface="Consolas" pitchFamily="49" charset="0"/>
-                <a:cs typeface="Consolas" pitchFamily="49" charset="0"/>
-              </a:rPr>
-              <a:t>aspx</a:t>
-            </a:r>
-            <a:r>
-              <a:rPr lang="en-US" sz="2800" dirty="0" smtClean="0"/>
-              <a:t> code. Display the current assembly location by </a:t>
-            </a:r>
-            <a:r>
-              <a:rPr lang="en-US" sz="2800" noProof="1" smtClean="0">
-                <a:solidFill>
-                  <a:schemeClr val="accent5">
-                    <a:lumMod val="20000"/>
-                    <a:lumOff val="80000"/>
-                  </a:schemeClr>
-                </a:solidFill>
-                <a:latin typeface="Consolas" pitchFamily="49" charset="0"/>
-              </a:rPr>
-              <a:t>Assembly.GetExecutingAssembly().Location</a:t>
-            </a:r>
-            <a:r>
-              <a:rPr lang="en-US" sz="2800" dirty="0" smtClean="0"/>
-              <a:t>.</a:t>
-            </a:r>
-            <a:endParaRPr lang="en-US" sz="2800" dirty="0"/>
-          </a:p>
-          <a:p>
-            <a:pPr marL="446088" indent="-446088">
-              <a:lnSpc>
-                <a:spcPts val="3700"/>
-              </a:lnSpc>
-              <a:buFontTx/>
-              <a:buAutoNum type="arabicPeriod"/>
-              <a:tabLst/>
-            </a:pPr>
-            <a:r>
-              <a:rPr lang="en-US" sz="2800" dirty="0" smtClean="0"/>
-              <a:t>Dump all </a:t>
-            </a:r>
-            <a:r>
-              <a:rPr lang="en-US" sz="2800" dirty="0"/>
-              <a:t>the events in </a:t>
-            </a:r>
-            <a:r>
-              <a:rPr lang="en-US" sz="2800" dirty="0" smtClean="0"/>
-              <a:t>the page execution lifecycle </a:t>
-            </a:r>
-            <a:r>
-              <a:rPr lang="en-US" sz="2800" dirty="0"/>
-              <a:t>using appropriate </a:t>
-            </a:r>
-            <a:r>
-              <a:rPr lang="en-US" sz="2800" dirty="0" smtClean="0"/>
-              <a:t>methods </a:t>
-            </a:r>
-            <a:r>
-              <a:rPr lang="en-US" sz="2800" dirty="0"/>
-              <a:t>or event </a:t>
-            </a:r>
-            <a:r>
-              <a:rPr lang="en-US" sz="2800" dirty="0" smtClean="0"/>
-              <a:t>handlers.</a:t>
-            </a:r>
-            <a:endParaRPr lang="en-US" sz="2800" dirty="0"/>
-          </a:p>
-        </p:txBody>
-      </p:sp>
-      <p:sp>
-        <p:nvSpPr>
-          <p:cNvPr id="4" name="Slide Number Placeholder 3"/>
-          <p:cNvSpPr>
-            <a:spLocks noGrp="1"/>
-          </p:cNvSpPr>
-          <p:nvPr>
-            <p:ph type="sldNum" sz="quarter" idx="10"/>
-          </p:nvPr>
-        </p:nvSpPr>
-        <p:spPr/>
-        <p:txBody>
-          <a:bodyPr/>
-          <a:lstStyle/>
-          <a:p>
-            <a:pPr>
-              <a:defRPr/>
-            </a:pPr>
-            <a:fld id="{58452FF4-89E3-4D1B-9927-2DBDC00E58D7}" type="slidenum">
-              <a:rPr lang="en-US" smtClean="0"/>
-              <a:pPr>
-                <a:defRPr/>
-              </a:pPr>
-              <a:t>36</a:t>
-            </a:fld>
-            <a:endParaRPr lang="en-US" dirty="0"/>
-          </a:p>
-        </p:txBody>
-      </p:sp>
-    </p:spTree>
-    <p:extLst>
-      <p:ext uri="{BB962C8B-B14F-4D97-AF65-F5344CB8AC3E}">
-        <p14:creationId xmlns:p14="http://schemas.microsoft.com/office/powerpoint/2010/main" val="1012186657"/>
-      </p:ext>
-    </p:extLst>
-  </p:cSld>
-  <p:clrMapOvr>
-    <a:masterClrMapping/>
-  </p:clrMapOvr>
-  <p:transition/>
-  <p:timing>
-    <p:tnLst>
-      <p:par>
-        <p:cTn id="1" dur="indefinite" restart="never" nodeType="tmRoot"/>
-      </p:par>
-    </p:tnLst>
-  </p:timing>
-</p:sld>
-</file>
-
-<file path=ppt/slides/slide37.xml><?xml version="1.0" encoding="utf-8"?>
 <p:sld xmlns:a="http://schemas.openxmlformats.org/drawingml/2006/main" xmlns:r="http://schemas.openxmlformats.org/officeDocument/2006/relationships" xmlns:p="http://schemas.openxmlformats.org/presentationml/2006/main">
   <p:cSld>
     <p:spTree>

</xml_diff>

<commit_message>
Updated demos and presentation for 02. ASP.NET-Web-Forms-Intro
</commit_message>
<xml_diff>
--- a/02. ASP.NET-Web-Forms-Intro/ASP.NET-Web-Forms-Intro.pptx
+++ b/02. ASP.NET-Web-Forms-Intro/ASP.NET-Web-Forms-Intro.pptx
@@ -5,10 +5,10 @@
     <p:sldMasterId id="2147483672" r:id="rId1"/>
   </p:sldMasterIdLst>
   <p:notesMasterIdLst>
-    <p:notesMasterId r:id="rId38"/>
+    <p:notesMasterId r:id="rId37"/>
   </p:notesMasterIdLst>
   <p:handoutMasterIdLst>
-    <p:handoutMasterId r:id="rId39"/>
+    <p:handoutMasterId r:id="rId38"/>
   </p:handoutMasterIdLst>
   <p:sldIdLst>
     <p:sldId id="320" r:id="rId2"/>
@@ -44,9 +44,8 @@
     <p:sldId id="366" r:id="rId32"/>
     <p:sldId id="367" r:id="rId33"/>
     <p:sldId id="368" r:id="rId34"/>
-    <p:sldId id="369" r:id="rId35"/>
-    <p:sldId id="334" r:id="rId36"/>
-    <p:sldId id="333" r:id="rId37"/>
+    <p:sldId id="334" r:id="rId35"/>
+    <p:sldId id="333" r:id="rId36"/>
   </p:sldIdLst>
   <p:sldSz cx="9144000" cy="6858000" type="screen4x3"/>
   <p:notesSz cx="6881813" cy="9296400"/>
@@ -4084,146 +4083,6 @@
     <p:extLst>
       <p:ext uri="{BB962C8B-B14F-4D97-AF65-F5344CB8AC3E}">
         <p14:creationId xmlns:p14="http://schemas.microsoft.com/office/powerpoint/2010/main" val="2582330818"/>
-      </p:ext>
-    </p:extLst>
-  </p:cSld>
-  <p:clrMapOvr>
-    <a:masterClrMapping/>
-  </p:clrMapOvr>
-</p:notes>
-</file>
-
-<file path=ppt/notesSlides/notesSlide23.xml><?xml version="1.0" encoding="utf-8"?>
-<p:notes xmlns:a="http://schemas.openxmlformats.org/drawingml/2006/main" xmlns:r="http://schemas.openxmlformats.org/officeDocument/2006/relationships" xmlns:p="http://schemas.openxmlformats.org/presentationml/2006/main">
-  <p:cSld>
-    <p:spTree>
-      <p:nvGrpSpPr>
-        <p:cNvPr id="1" name=""/>
-        <p:cNvGrpSpPr/>
-        <p:nvPr/>
-      </p:nvGrpSpPr>
-      <p:grpSpPr>
-        <a:xfrm>
-          <a:off x="0" y="0"/>
-          <a:ext cx="0" cy="0"/>
-          <a:chOff x="0" y="0"/>
-          <a:chExt cx="0" cy="0"/>
-        </a:xfrm>
-      </p:grpSpPr>
-      <p:sp>
-        <p:nvSpPr>
-          <p:cNvPr id="4" name="Rectangle 2"/>
-          <p:cNvSpPr>
-            <a:spLocks noGrp="1" noChangeArrowheads="1"/>
-          </p:cNvSpPr>
-          <p:nvPr>
-            <p:ph type="hdr" sz="quarter"/>
-          </p:nvPr>
-        </p:nvSpPr>
-        <p:spPr>
-          <a:ln/>
-        </p:spPr>
-        <p:txBody>
-          <a:bodyPr/>
-          <a:lstStyle/>
-          <a:p>
-            <a:r>
-              <a:rPr lang="en-US" dirty="0"/>
-              <a:t>*</a:t>
-            </a:r>
-          </a:p>
-        </p:txBody>
-      </p:sp>
-      <p:sp>
-        <p:nvSpPr>
-          <p:cNvPr id="5" name="Rectangle 6"/>
-          <p:cNvSpPr>
-            <a:spLocks noGrp="1" noChangeArrowheads="1"/>
-          </p:cNvSpPr>
-          <p:nvPr>
-            <p:ph type="ftr" sz="quarter" idx="4"/>
-          </p:nvPr>
-        </p:nvSpPr>
-        <p:spPr>
-          <a:ln/>
-        </p:spPr>
-        <p:txBody>
-          <a:bodyPr/>
-          <a:lstStyle/>
-          <a:p>
-            <a:r>
-              <a:rPr lang="en-US" dirty="0"/>
-              <a:t>(c) 2008 National Academy for Software Development - http://academy.devbg.org. All rights reserved. Unauthorized copying or re-distribution is strictly prohibited.*</a:t>
-            </a:r>
-          </a:p>
-        </p:txBody>
-      </p:sp>
-      <p:sp>
-        <p:nvSpPr>
-          <p:cNvPr id="6" name="Rectangle 7"/>
-          <p:cNvSpPr>
-            <a:spLocks noGrp="1" noChangeArrowheads="1"/>
-          </p:cNvSpPr>
-          <p:nvPr>
-            <p:ph type="sldNum" sz="quarter" idx="5"/>
-          </p:nvPr>
-        </p:nvSpPr>
-        <p:spPr>
-          <a:ln/>
-        </p:spPr>
-        <p:txBody>
-          <a:bodyPr/>
-          <a:lstStyle/>
-          <a:p>
-            <a:fld id="{6A07D6CF-7CF0-4D95-A60A-E2D82CCA0112}" type="slidenum">
-              <a:rPr lang="en-US"/>
-              <a:pPr/>
-              <a:t>34</a:t>
-            </a:fld>
-            <a:r>
-              <a:rPr lang="en-US" dirty="0"/>
-              <a:t>##</a:t>
-            </a:r>
-          </a:p>
-        </p:txBody>
-      </p:sp>
-      <p:sp>
-        <p:nvSpPr>
-          <p:cNvPr id="523266" name="Rectangle 2"/>
-          <p:cNvSpPr>
-            <a:spLocks noGrp="1" noRot="1" noChangeAspect="1" noChangeArrowheads="1" noTextEdit="1"/>
-          </p:cNvSpPr>
-          <p:nvPr>
-            <p:ph type="sldImg"/>
-          </p:nvPr>
-        </p:nvSpPr>
-        <p:spPr>
-          <a:ln/>
-        </p:spPr>
-      </p:sp>
-      <p:sp>
-        <p:nvSpPr>
-          <p:cNvPr id="523267" name="Rectangle 3"/>
-          <p:cNvSpPr>
-            <a:spLocks noGrp="1" noChangeArrowheads="1"/>
-          </p:cNvSpPr>
-          <p:nvPr>
-            <p:ph type="body" idx="1"/>
-          </p:nvPr>
-        </p:nvSpPr>
-        <p:spPr/>
-        <p:txBody>
-          <a:bodyPr/>
-          <a:lstStyle/>
-          <a:p>
-            <a:endParaRPr lang="bg-BG"/>
-          </a:p>
-        </p:txBody>
-      </p:sp>
-    </p:spTree>
-    <p:extLst>
-      <p:ext uri="{BB962C8B-B14F-4D97-AF65-F5344CB8AC3E}">
-        <p14:creationId xmlns:p14="http://schemas.microsoft.com/office/powerpoint/2010/main" val="1973112393"/>
       </p:ext>
     </p:extLst>
   </p:cSld>
@@ -15221,8 +15080,8 @@
         </p:nvSpPr>
         <p:spPr>
           <a:xfrm>
-            <a:off x="228600" y="990600"/>
-            <a:ext cx="8686800" cy="5715000"/>
+            <a:off x="228600" y="914400"/>
+            <a:ext cx="8686800" cy="5791200"/>
           </a:xfrm>
         </p:spPr>
         <p:txBody>
@@ -15298,8 +15157,8 @@
         </p:blipFill>
         <p:spPr bwMode="auto">
           <a:xfrm>
-            <a:off x="1862022" y="1905000"/>
-            <a:ext cx="5329468" cy="4344988"/>
+            <a:off x="1674576" y="1752600"/>
+            <a:ext cx="5794847" cy="4724400"/>
           </a:xfrm>
           <a:prstGeom prst="roundRect">
             <a:avLst>
@@ -15736,94 +15595,6 @@
           <a:chExt cx="0" cy="0"/>
         </a:xfrm>
       </p:grpSpPr>
-      <p:sp>
-        <p:nvSpPr>
-          <p:cNvPr id="498690" name="Rectangle 2"/>
-          <p:cNvSpPr>
-            <a:spLocks noGrp="1" noChangeArrowheads="1"/>
-          </p:cNvSpPr>
-          <p:nvPr>
-            <p:ph type="title"/>
-          </p:nvPr>
-        </p:nvSpPr>
-        <p:spPr/>
-        <p:txBody>
-          <a:bodyPr/>
-          <a:lstStyle/>
-          <a:p>
-            <a:r>
-              <a:rPr lang="en-US" dirty="0" smtClean="0"/>
-              <a:t>ASP.NET Execution </a:t>
-            </a:r>
-            <a:r>
-              <a:rPr lang="en-US" dirty="0"/>
-              <a:t>Model (2)</a:t>
-            </a:r>
-            <a:endParaRPr lang="bg-BG" dirty="0"/>
-          </a:p>
-        </p:txBody>
-      </p:sp>
-      <p:sp>
-        <p:nvSpPr>
-          <p:cNvPr id="498691" name="Rectangle 3"/>
-          <p:cNvSpPr>
-            <a:spLocks noGrp="1" noChangeArrowheads="1"/>
-          </p:cNvSpPr>
-          <p:nvPr>
-            <p:ph idx="1"/>
-          </p:nvPr>
-        </p:nvSpPr>
-        <p:spPr>
-          <a:xfrm>
-            <a:off x="228600" y="990600"/>
-            <a:ext cx="8686800" cy="5715000"/>
-          </a:xfrm>
-        </p:spPr>
-        <p:txBody>
-          <a:bodyPr/>
-          <a:lstStyle/>
-          <a:p>
-            <a:r>
-              <a:rPr lang="en-US" dirty="0"/>
-              <a:t>Any other call after </a:t>
-            </a:r>
-            <a:r>
-              <a:rPr lang="en-US" dirty="0" smtClean="0"/>
-              <a:t>the first </a:t>
-            </a:r>
-            <a:endParaRPr lang="en-US" dirty="0"/>
-          </a:p>
-        </p:txBody>
-      </p:sp>
-      <p:sp>
-        <p:nvSpPr>
-          <p:cNvPr id="5" name="Slide Number Placeholder 3"/>
-          <p:cNvSpPr>
-            <a:spLocks noGrp="1"/>
-          </p:cNvSpPr>
-          <p:nvPr>
-            <p:ph type="sldNum" sz="quarter" idx="10"/>
-          </p:nvPr>
-        </p:nvSpPr>
-        <p:spPr/>
-        <p:txBody>
-          <a:bodyPr/>
-          <a:lstStyle/>
-          <a:p>
-            <a:pPr>
-              <a:defRPr/>
-            </a:pPr>
-            <a:fld id="{58452FF4-89E3-4D1B-9927-2DBDC00E58D7}" type="slidenum">
-              <a:rPr lang="en-US" smtClean="0"/>
-              <a:pPr>
-                <a:defRPr/>
-              </a:pPr>
-              <a:t>20</a:t>
-            </a:fld>
-            <a:endParaRPr lang="en-US" dirty="0"/>
-          </a:p>
-        </p:txBody>
-      </p:sp>
       <p:pic>
         <p:nvPicPr>
           <p:cNvPr id="498693" name="Picture 5"/>
@@ -15855,8 +15626,8 @@
         </p:blipFill>
         <p:spPr bwMode="auto">
           <a:xfrm>
-            <a:off x="1860081" y="1905000"/>
-            <a:ext cx="5387326" cy="4364676"/>
+            <a:off x="1674576" y="1752600"/>
+            <a:ext cx="5831334" cy="4724400"/>
           </a:xfrm>
           <a:prstGeom prst="roundRect">
             <a:avLst>
@@ -15874,6 +15645,94 @@
           </a:ln>
         </p:spPr>
       </p:pic>
+      <p:sp>
+        <p:nvSpPr>
+          <p:cNvPr id="498690" name="Rectangle 2"/>
+          <p:cNvSpPr>
+            <a:spLocks noGrp="1" noChangeArrowheads="1"/>
+          </p:cNvSpPr>
+          <p:nvPr>
+            <p:ph type="title"/>
+          </p:nvPr>
+        </p:nvSpPr>
+        <p:spPr/>
+        <p:txBody>
+          <a:bodyPr/>
+          <a:lstStyle/>
+          <a:p>
+            <a:r>
+              <a:rPr lang="en-US" dirty="0" smtClean="0"/>
+              <a:t>ASP.NET Execution </a:t>
+            </a:r>
+            <a:r>
+              <a:rPr lang="en-US" dirty="0"/>
+              <a:t>Model (2)</a:t>
+            </a:r>
+            <a:endParaRPr lang="bg-BG" dirty="0"/>
+          </a:p>
+        </p:txBody>
+      </p:sp>
+      <p:sp>
+        <p:nvSpPr>
+          <p:cNvPr id="498691" name="Rectangle 3"/>
+          <p:cNvSpPr>
+            <a:spLocks noGrp="1" noChangeArrowheads="1"/>
+          </p:cNvSpPr>
+          <p:nvPr>
+            <p:ph idx="1"/>
+          </p:nvPr>
+        </p:nvSpPr>
+        <p:spPr>
+          <a:xfrm>
+            <a:off x="228600" y="914400"/>
+            <a:ext cx="8686800" cy="5791200"/>
+          </a:xfrm>
+        </p:spPr>
+        <p:txBody>
+          <a:bodyPr/>
+          <a:lstStyle/>
+          <a:p>
+            <a:r>
+              <a:rPr lang="en-US" dirty="0"/>
+              <a:t>Any other call after </a:t>
+            </a:r>
+            <a:r>
+              <a:rPr lang="en-US" dirty="0" smtClean="0"/>
+              <a:t>the first </a:t>
+            </a:r>
+            <a:endParaRPr lang="en-US" dirty="0"/>
+          </a:p>
+        </p:txBody>
+      </p:sp>
+      <p:sp>
+        <p:nvSpPr>
+          <p:cNvPr id="5" name="Slide Number Placeholder 3"/>
+          <p:cNvSpPr>
+            <a:spLocks noGrp="1"/>
+          </p:cNvSpPr>
+          <p:nvPr>
+            <p:ph type="sldNum" sz="quarter" idx="10"/>
+          </p:nvPr>
+        </p:nvSpPr>
+        <p:spPr/>
+        <p:txBody>
+          <a:bodyPr/>
+          <a:lstStyle/>
+          <a:p>
+            <a:pPr>
+              <a:defRPr/>
+            </a:pPr>
+            <a:fld id="{58452FF4-89E3-4D1B-9927-2DBDC00E58D7}" type="slidenum">
+              <a:rPr lang="en-US" smtClean="0"/>
+              <a:pPr>
+                <a:defRPr/>
+              </a:pPr>
+              <a:t>20</a:t>
+            </a:fld>
+            <a:endParaRPr lang="en-US" dirty="0"/>
+          </a:p>
+        </p:txBody>
+      </p:sp>
     </p:spTree>
     <p:extLst>
       <p:ext uri="{BB962C8B-B14F-4D97-AF65-F5344CB8AC3E}">
@@ -17906,8 +17765,8 @@
         </p:blipFill>
         <p:spPr bwMode="auto">
           <a:xfrm>
-            <a:off x="3429000" y="381000"/>
-            <a:ext cx="4906547" cy="6096507"/>
+            <a:off x="3276600" y="152400"/>
+            <a:ext cx="5257800" cy="6532948"/>
           </a:xfrm>
           <a:prstGeom prst="roundRect">
             <a:avLst>
@@ -18539,8 +18398,8 @@
         </p:blipFill>
         <p:spPr bwMode="auto">
           <a:xfrm>
-            <a:off x="1206500" y="1054100"/>
-            <a:ext cx="6743700" cy="5435600"/>
+            <a:off x="838200" y="848718"/>
+            <a:ext cx="7391400" cy="5957663"/>
           </a:xfrm>
           <a:prstGeom prst="roundRect">
             <a:avLst>
@@ -19354,55 +19213,6 @@
       </p:sp>
       <p:pic>
         <p:nvPicPr>
-          <p:cNvPr id="2" name="Picture 2" descr="http://www.nrc-pad.org/images/stories/faq%20icon2.jpg"/>
-          <p:cNvPicPr>
-            <a:picLocks noChangeAspect="1" noChangeArrowheads="1"/>
-          </p:cNvPicPr>
-          <p:nvPr/>
-        </p:nvPicPr>
-        <p:blipFill>
-          <a:blip r:embed="rId4" cstate="print">
-            <a:extLst>
-              <a:ext uri="{28A0092B-C50C-407E-A947-70E740481C1C}">
-                <a14:useLocalDpi xmlns:a14="http://schemas.microsoft.com/office/drawing/2010/main"/>
-              </a:ext>
-            </a:extLst>
-          </a:blip>
-          <a:srcRect/>
-          <a:stretch>
-            <a:fillRect/>
-          </a:stretch>
-        </p:blipFill>
-        <p:spPr bwMode="auto">
-          <a:xfrm rot="1484183">
-            <a:off x="6456846" y="2964564"/>
-            <a:ext cx="857250" cy="1285876"/>
-          </a:xfrm>
-          <a:prstGeom prst="roundRect">
-            <a:avLst>
-              <a:gd name="adj" fmla="val 8594"/>
-            </a:avLst>
-          </a:prstGeom>
-          <a:solidFill>
-            <a:srgbClr val="FFFFFF">
-              <a:shade val="85000"/>
-            </a:srgbClr>
-          </a:solidFill>
-          <a:ln>
-            <a:noFill/>
-          </a:ln>
-          <a:effectLst>
-            <a:outerShdw blurRad="50800" dist="38100" dir="8100000" algn="tr" rotWithShape="0">
-              <a:prstClr val="black">
-                <a:alpha val="40000"/>
-              </a:prstClr>
-            </a:outerShdw>
-            <a:reflection blurRad="12700" stA="38000" endPos="28000" dist="5000" dir="5400000" sy="-100000" algn="bl" rotWithShape="0"/>
-          </a:effectLst>
-        </p:spPr>
-      </p:pic>
-      <p:pic>
-        <p:nvPicPr>
           <p:cNvPr id="5" name="Picture 3"/>
           <p:cNvPicPr>
             <a:picLocks noChangeAspect="1" noChangeArrowheads="1"/>
@@ -19410,11 +19220,11 @@
           <p:nvPr/>
         </p:nvPicPr>
         <p:blipFill rotWithShape="1">
-          <a:blip r:embed="rId5" cstate="screen">
+          <a:blip r:embed="rId4" cstate="screen">
             <a:extLst>
               <a:ext uri="{BEBA8EAE-BF5A-486C-A8C5-ECC9F3942E4B}">
                 <a14:imgProps xmlns:a14="http://schemas.microsoft.com/office/drawing/2010/main">
-                  <a14:imgLayer r:embed="rId6">
+                  <a14:imgLayer r:embed="rId5">
                     <a14:imgEffect>
                       <a14:colorTemperature colorTemp="11200"/>
                     </a14:imgEffect>
@@ -19465,6 +19275,54 @@
           </a:sp3d>
         </p:spPr>
       </p:pic>
+      <p:pic>
+        <p:nvPicPr>
+          <p:cNvPr id="6" name="Picture 1"/>
+          <p:cNvPicPr>
+            <a:picLocks noChangeAspect="1" noChangeArrowheads="1"/>
+          </p:cNvPicPr>
+          <p:nvPr/>
+        </p:nvPicPr>
+        <p:blipFill>
+          <a:blip r:embed="rId6" cstate="print">
+            <a:extLst>
+              <a:ext uri="{28A0092B-C50C-407E-A947-70E740481C1C}">
+                <a14:useLocalDpi xmlns:a14="http://schemas.microsoft.com/office/drawing/2010/main"/>
+              </a:ext>
+            </a:extLst>
+          </a:blip>
+          <a:srcRect/>
+          <a:stretch>
+            <a:fillRect/>
+          </a:stretch>
+        </p:blipFill>
+        <p:spPr bwMode="auto">
+          <a:xfrm rot="880103">
+            <a:off x="6348358" y="2523176"/>
+            <a:ext cx="1482419" cy="1582114"/>
+          </a:xfrm>
+          <a:prstGeom prst="roundRect">
+            <a:avLst>
+              <a:gd name="adj" fmla="val 5297"/>
+            </a:avLst>
+          </a:prstGeom>
+          <a:solidFill>
+            <a:srgbClr val="FFFFFF">
+              <a:shade val="85000"/>
+            </a:srgbClr>
+          </a:solidFill>
+          <a:ln>
+            <a:noFill/>
+          </a:ln>
+          <a:effectLst>
+            <a:reflection blurRad="12700" stA="38000" endPos="28000" dist="5000" dir="5400000" sy="-100000" algn="bl" rotWithShape="0"/>
+          </a:effectLst>
+          <a:scene3d>
+            <a:camera prst="perspectiveRight"/>
+            <a:lightRig rig="threePt" dir="t"/>
+          </a:scene3d>
+        </p:spPr>
+      </p:pic>
     </p:spTree>
     <p:extLst>
       <p:ext uri="{BB962C8B-B14F-4D97-AF65-F5344CB8AC3E}">
@@ -20408,236 +20266,6 @@
       </p:grpSpPr>
       <p:sp>
         <p:nvSpPr>
-          <p:cNvPr id="522242" name="Rectangle 2"/>
-          <p:cNvSpPr>
-            <a:spLocks noGrp="1" noChangeArrowheads="1"/>
-          </p:cNvSpPr>
-          <p:nvPr>
-            <p:ph type="ctrTitle"/>
-          </p:nvPr>
-        </p:nvSpPr>
-        <p:spPr>
-          <a:xfrm>
-            <a:off x="457200" y="4572001"/>
-            <a:ext cx="8229600" cy="685800"/>
-          </a:xfrm>
-        </p:spPr>
-        <p:txBody>
-          <a:bodyPr/>
-          <a:lstStyle/>
-          <a:p>
-            <a:pPr>
-              <a:lnSpc>
-                <a:spcPct val="110000"/>
-              </a:lnSpc>
-            </a:pPr>
-            <a:r>
-              <a:rPr lang="en-US" dirty="0"/>
-              <a:t>Using the </a:t>
-            </a:r>
-            <a:r>
-              <a:rPr lang="en-US" dirty="0">
-                <a:latin typeface="Consolas" pitchFamily="49" charset="0"/>
-              </a:rPr>
-              <a:t>@Page</a:t>
-            </a:r>
-            <a:r>
-              <a:rPr lang="en-US" dirty="0"/>
-              <a:t> </a:t>
-            </a:r>
-            <a:r>
-              <a:rPr lang="en-US" dirty="0" smtClean="0"/>
-              <a:t>Directive</a:t>
-            </a:r>
-            <a:endParaRPr lang="bg-BG" dirty="0"/>
-          </a:p>
-        </p:txBody>
-      </p:sp>
-      <p:sp>
-        <p:nvSpPr>
-          <p:cNvPr id="4" name="Subtitle 3"/>
-          <p:cNvSpPr>
-            <a:spLocks noGrp="1"/>
-          </p:cNvSpPr>
-          <p:nvPr>
-            <p:ph type="subTitle" idx="1"/>
-          </p:nvPr>
-        </p:nvSpPr>
-        <p:spPr>
-          <a:xfrm>
-            <a:off x="457200" y="5450680"/>
-            <a:ext cx="8229600" cy="569120"/>
-          </a:xfrm>
-        </p:spPr>
-        <p:txBody>
-          <a:bodyPr/>
-          <a:lstStyle/>
-          <a:p>
-            <a:r>
-              <a:rPr dirty="0" smtClean="0"/>
-              <a:t>Live Demo</a:t>
-            </a:r>
-            <a:endParaRPr lang="bg-BG" dirty="0"/>
-          </a:p>
-        </p:txBody>
-      </p:sp>
-      <p:pic>
-        <p:nvPicPr>
-          <p:cNvPr id="5121" name="Picture 1"/>
-          <p:cNvPicPr>
-            <a:picLocks noChangeAspect="1" noChangeArrowheads="1"/>
-          </p:cNvPicPr>
-          <p:nvPr/>
-        </p:nvPicPr>
-        <p:blipFill>
-          <a:blip r:embed="rId3" cstate="print">
-            <a:extLst>
-              <a:ext uri="{28A0092B-C50C-407E-A947-70E740481C1C}">
-                <a14:useLocalDpi xmlns:a14="http://schemas.microsoft.com/office/drawing/2010/main"/>
-              </a:ext>
-            </a:extLst>
-          </a:blip>
-          <a:srcRect/>
-          <a:stretch>
-            <a:fillRect/>
-          </a:stretch>
-        </p:blipFill>
-        <p:spPr bwMode="auto">
-          <a:xfrm>
-            <a:off x="5918078" y="1190625"/>
-            <a:ext cx="2311522" cy="2466976"/>
-          </a:xfrm>
-          <a:prstGeom prst="roundRect">
-            <a:avLst>
-              <a:gd name="adj" fmla="val 5297"/>
-            </a:avLst>
-          </a:prstGeom>
-          <a:solidFill>
-            <a:srgbClr val="FFFFFF">
-              <a:shade val="85000"/>
-            </a:srgbClr>
-          </a:solidFill>
-          <a:ln>
-            <a:noFill/>
-          </a:ln>
-          <a:effectLst>
-            <a:reflection blurRad="12700" stA="38000" endPos="28000" dist="5000" dir="5400000" sy="-100000" algn="bl" rotWithShape="0"/>
-          </a:effectLst>
-          <a:scene3d>
-            <a:camera prst="perspectiveRight"/>
-            <a:lightRig rig="threePt" dir="t"/>
-          </a:scene3d>
-        </p:spPr>
-      </p:pic>
-      <p:pic>
-        <p:nvPicPr>
-          <p:cNvPr id="5122" name="Picture 2" descr="http://www.crystalxp.net/galerie/img/img-icons-a-png-blank-page-icon-set-varsok-9966.png"/>
-          <p:cNvPicPr>
-            <a:picLocks noChangeAspect="1" noChangeArrowheads="1"/>
-          </p:cNvPicPr>
-          <p:nvPr/>
-        </p:nvPicPr>
-        <p:blipFill>
-          <a:blip r:embed="rId4" cstate="print">
-            <a:extLst>
-              <a:ext uri="{28A0092B-C50C-407E-A947-70E740481C1C}">
-                <a14:useLocalDpi xmlns:a14="http://schemas.microsoft.com/office/drawing/2010/main"/>
-              </a:ext>
-            </a:extLst>
-          </a:blip>
-          <a:srcRect/>
-          <a:stretch>
-            <a:fillRect/>
-          </a:stretch>
-        </p:blipFill>
-        <p:spPr bwMode="auto">
-          <a:xfrm rot="1112707">
-            <a:off x="3680628" y="1170783"/>
-            <a:ext cx="2857500" cy="2857500"/>
-          </a:xfrm>
-          <a:prstGeom prst="rect">
-            <a:avLst/>
-          </a:prstGeom>
-          <a:noFill/>
-        </p:spPr>
-      </p:pic>
-      <p:pic>
-        <p:nvPicPr>
-          <p:cNvPr id="5124" name="Picture 4" descr="http://www.bukovinasociety.org/museum/museum-images/Fam-docs/schneider-bernie-Wasyl-passport-last-page.jpg"/>
-          <p:cNvPicPr>
-            <a:picLocks noChangeAspect="1" noChangeArrowheads="1"/>
-          </p:cNvPicPr>
-          <p:nvPr/>
-        </p:nvPicPr>
-        <p:blipFill>
-          <a:blip r:embed="rId5" cstate="screen">
-            <a:extLst>
-              <a:ext uri="{28A0092B-C50C-407E-A947-70E740481C1C}">
-                <a14:useLocalDpi xmlns:a14="http://schemas.microsoft.com/office/drawing/2010/main"/>
-              </a:ext>
-            </a:extLst>
-          </a:blip>
-          <a:srcRect/>
-          <a:stretch>
-            <a:fillRect/>
-          </a:stretch>
-        </p:blipFill>
-        <p:spPr bwMode="auto">
-          <a:xfrm rot="4385974">
-            <a:off x="1371154" y="1145916"/>
-            <a:ext cx="2285244" cy="3289368"/>
-          </a:xfrm>
-          <a:prstGeom prst="rect">
-            <a:avLst/>
-          </a:prstGeom>
-          <a:ln>
-            <a:noFill/>
-          </a:ln>
-          <a:effectLst>
-            <a:softEdge rad="112500"/>
-          </a:effectLst>
-        </p:spPr>
-      </p:pic>
-    </p:spTree>
-    <p:extLst>
-      <p:ext uri="{BB962C8B-B14F-4D97-AF65-F5344CB8AC3E}">
-        <p14:creationId xmlns:p14="http://schemas.microsoft.com/office/powerpoint/2010/main" val="3087145444"/>
-      </p:ext>
-    </p:extLst>
-  </p:cSld>
-  <p:clrMapOvr>
-    <a:masterClrMapping/>
-  </p:clrMapOvr>
-  <p:transition/>
-  <p:timing>
-    <p:tnLst>
-      <p:par>
-        <p:cTn id="1" dur="indefinite" restart="never" nodeType="tmRoot"/>
-      </p:par>
-    </p:tnLst>
-  </p:timing>
-</p:sld>
-</file>
-
-<file path=ppt/slides/slide35.xml><?xml version="1.0" encoding="utf-8"?>
-<p:sld xmlns:a="http://schemas.openxmlformats.org/drawingml/2006/main" xmlns:r="http://schemas.openxmlformats.org/officeDocument/2006/relationships" xmlns:p="http://schemas.openxmlformats.org/presentationml/2006/main">
-  <p:cSld>
-    <p:spTree>
-      <p:nvGrpSpPr>
-        <p:cNvPr id="1" name=""/>
-        <p:cNvGrpSpPr/>
-        <p:nvPr/>
-      </p:nvGrpSpPr>
-      <p:grpSpPr>
-        <a:xfrm>
-          <a:off x="0" y="0"/>
-          <a:ext cx="0" cy="0"/>
-          <a:chOff x="0" y="0"/>
-          <a:chExt cx="0" cy="0"/>
-        </a:xfrm>
-      </p:grpSpPr>
-      <p:sp>
-        <p:nvSpPr>
           <p:cNvPr id="2" name="Title 1"/>
           <p:cNvSpPr>
             <a:spLocks noGrp="1"/>
@@ -20713,7 +20341,7 @@
 </p:sld>
 </file>
 
-<file path=ppt/slides/slide36.xml><?xml version="1.0" encoding="utf-8"?>
+<file path=ppt/slides/slide35.xml><?xml version="1.0" encoding="utf-8"?>
 <p:sld xmlns:a="http://schemas.openxmlformats.org/drawingml/2006/main" xmlns:r="http://schemas.openxmlformats.org/officeDocument/2006/relationships" xmlns:p="http://schemas.openxmlformats.org/presentationml/2006/main">
   <p:cSld>
     <p:spTree>
@@ -21536,8 +21164,13 @@
             </a:pPr>
             <a:r>
               <a:rPr lang="en-US" dirty="0" smtClean="0"/>
-              <a:t>Component-based development</a:t>
-            </a:r>
+              <a:t>Component-based </a:t>
+            </a:r>
+            <a:r>
+              <a:rPr lang="en-US" dirty="0" smtClean="0"/>
+              <a:t>development (like JSF)</a:t>
+            </a:r>
+            <a:endParaRPr lang="en-US" dirty="0" smtClean="0"/>
           </a:p>
           <a:p>
             <a:pPr lvl="1">

</xml_diff>